<commit_message>
Add Module-11 with assignment-1
</commit_message>
<xml_diff>
--- a/module-11/assignment-1.pptx
+++ b/module-11/assignment-1.pptx
@@ -390,7 +390,7 @@
           <a:p>
             <a:fld id="{3ABD2D7A-D230-4F91-BD59-0A39C2703BA8}" type="datetimeFigureOut">
               <a:rPr lang="en-US"/>
-              <a:t>2025-02-28</a:t>
+              <a:t>2025-03-02</a:t>
             </a:fld>
             <a:endParaRPr/>
           </a:p>
@@ -999,7 +999,7 @@
           <a:p>
             <a:fld id="{03F41C87-7AD9-4845-A077-840E4A0F3F06}" type="datetimeFigureOut">
               <a:rPr lang="en-US"/>
-              <a:t>2025-02-28</a:t>
+              <a:t>2025-03-02</a:t>
             </a:fld>
             <a:endParaRPr/>
           </a:p>
@@ -1191,7 +1191,7 @@
           <a:p>
             <a:fld id="{03F41C87-7AD9-4845-A077-840E4A0F3F06}" type="datetimeFigureOut">
               <a:rPr lang="en-US"/>
-              <a:t>2025-02-28</a:t>
+              <a:t>2025-03-02</a:t>
             </a:fld>
             <a:endParaRPr/>
           </a:p>
@@ -1380,7 +1380,7 @@
           <a:p>
             <a:fld id="{03F41C87-7AD9-4845-A077-840E4A0F3F06}" type="datetimeFigureOut">
               <a:rPr lang="en-US"/>
-              <a:t>2025-02-28</a:t>
+              <a:t>2025-03-02</a:t>
             </a:fld>
             <a:endParaRPr/>
           </a:p>
@@ -1660,7 +1660,7 @@
           <a:p>
             <a:fld id="{03F41C87-7AD9-4845-A077-840E4A0F3F06}" type="datetimeFigureOut">
               <a:rPr lang="en-US"/>
-              <a:t>2025-02-28</a:t>
+              <a:t>2025-03-02</a:t>
             </a:fld>
             <a:endParaRPr/>
           </a:p>
@@ -1964,7 +1964,7 @@
           <a:p>
             <a:fld id="{03F41C87-7AD9-4845-A077-840E4A0F3F06}" type="datetimeFigureOut">
               <a:rPr lang="en-US"/>
-              <a:t>2025-02-28</a:t>
+              <a:t>2025-03-02</a:t>
             </a:fld>
             <a:endParaRPr/>
           </a:p>
@@ -2420,7 +2420,7 @@
           <a:p>
             <a:fld id="{03F41C87-7AD9-4845-A077-840E4A0F3F06}" type="datetimeFigureOut">
               <a:rPr lang="en-US"/>
-              <a:t>2025-02-28</a:t>
+              <a:t>2025-03-02</a:t>
             </a:fld>
             <a:endParaRPr/>
           </a:p>
@@ -2550,7 +2550,7 @@
           <a:p>
             <a:fld id="{03F41C87-7AD9-4845-A077-840E4A0F3F06}" type="datetimeFigureOut">
               <a:rPr lang="en-US"/>
-              <a:t>2025-02-28</a:t>
+              <a:t>2025-03-02</a:t>
             </a:fld>
             <a:endParaRPr/>
           </a:p>
@@ -2665,7 +2665,7 @@
           <a:p>
             <a:fld id="{03F41C87-7AD9-4845-A077-840E4A0F3F06}" type="datetimeFigureOut">
               <a:rPr lang="en-US"/>
-              <a:t>2025-02-28</a:t>
+              <a:t>2025-03-02</a:t>
             </a:fld>
             <a:endParaRPr/>
           </a:p>
@@ -2987,7 +2987,7 @@
           <a:p>
             <a:fld id="{03F41C87-7AD9-4845-A077-840E4A0F3F06}" type="datetimeFigureOut">
               <a:rPr lang="en-US"/>
-              <a:t>2025-02-28</a:t>
+              <a:t>2025-03-02</a:t>
             </a:fld>
             <a:endParaRPr/>
           </a:p>
@@ -3299,7 +3299,7 @@
             <a:fld id="{03F41C87-7AD9-4845-A077-840E4A0F3F06}" type="datetimeFigureOut">
               <a:rPr lang="en-US"/>
               <a:pPr/>
-              <a:t>2025-02-28</a:t>
+              <a:t>2025-03-02</a:t>
             </a:fld>
             <a:endParaRPr/>
           </a:p>
@@ -3553,7 +3553,7 @@
             <a:fld id="{03F41C87-7AD9-4845-A077-840E4A0F3F06}" type="datetimeFigureOut">
               <a:rPr lang="en-US" smtClean="0"/>
               <a:pPr/>
-              <a:t>2025-02-28</a:t>
+              <a:t>2025-03-02</a:t>
             </a:fld>
             <a:endParaRPr lang="en-US"/>
           </a:p>
@@ -4017,6 +4017,13 @@
               <a:rPr lang="it-IT" dirty="0"/>
               <a:t>Vanh Somchaleun</a:t>
             </a:r>
+          </a:p>
+          <a:p>
+            <a:r>
+              <a:rPr lang="it-IT"/>
+              <a:t>https://github.com/VanhSom/csd-380.git</a:t>
+            </a:r>
+            <a:endParaRPr lang="it-IT" dirty="0"/>
           </a:p>
           <a:p>
             <a:r>

</xml_diff>